<commit_message>
Update new slide on powerpoint
</commit_message>
<xml_diff>
--- a/atKarma Presentation_08272016.pptx
+++ b/atKarma Presentation_08272016.pptx
@@ -18,6 +18,7 @@
     <p:sldId id="267" r:id="rId12"/>
     <p:sldId id="268" r:id="rId13"/>
     <p:sldId id="269" r:id="rId14"/>
+    <p:sldId id="270" r:id="rId15"/>
   </p:sldIdLst>
   <p:sldSz cx="12192000" cy="6858000"/>
   <p:notesSz cx="6858000" cy="9144000"/>
@@ -116,6 +117,11 @@
       </a:defRPr>
     </a:lvl9pPr>
   </p:defaultTextStyle>
+  <p:extLst>
+    <p:ext uri="{EFAFB233-063F-42B5-8137-9DF3F51BA10A}">
+      <p15:sldGuideLst xmlns:p15="http://schemas.microsoft.com/office/powerpoint/2012/main"/>
+    </p:ext>
+  </p:extLst>
 </p:presentation>
 </file>
 
@@ -214,7 +220,7 @@
           <a:effectLst/>
           <a:extLst>
             <a:ext uri="{91240B29-F687-4f45-9708-019B960494DF}">
-              <a14:hiddenLine xmlns:a14="http://schemas.microsoft.com/office/drawing/2010/main" xmlns="" w="9525">
+              <a14:hiddenLine xmlns="" xmlns:a14="http://schemas.microsoft.com/office/drawing/2010/main" w="9525">
                 <a:solidFill>
                   <a:srgbClr val="000000"/>
                 </a:solidFill>
@@ -406,7 +412,7 @@
           <a:p>
             <a:fld id="{2373D046-40F4-47F3-9B97-2E7371F9C148}" type="datetimeFigureOut">
               <a:rPr lang="en-US" smtClean="0"/>
-              <a:t>8/27/2016</a:t>
+              <a:t>8/27/16</a:t>
             </a:fld>
             <a:endParaRPr lang="en-US"/>
           </a:p>
@@ -724,7 +730,7 @@
           <a:p>
             <a:fld id="{2373D046-40F4-47F3-9B97-2E7371F9C148}" type="datetimeFigureOut">
               <a:rPr lang="en-US" smtClean="0"/>
-              <a:t>8/27/2016</a:t>
+              <a:t>8/27/16</a:t>
             </a:fld>
             <a:endParaRPr lang="en-US"/>
           </a:p>
@@ -1212,7 +1218,7 @@
           <a:p>
             <a:fld id="{2373D046-40F4-47F3-9B97-2E7371F9C148}" type="datetimeFigureOut">
               <a:rPr lang="en-US" smtClean="0"/>
-              <a:t>8/27/2016</a:t>
+              <a:t>8/27/16</a:t>
             </a:fld>
             <a:endParaRPr lang="en-US"/>
           </a:p>
@@ -1581,7 +1587,7 @@
           <a:p>
             <a:fld id="{2373D046-40F4-47F3-9B97-2E7371F9C148}" type="datetimeFigureOut">
               <a:rPr lang="en-US" smtClean="0"/>
-              <a:t>8/27/2016</a:t>
+              <a:t>8/27/16</a:t>
             </a:fld>
             <a:endParaRPr lang="en-US"/>
           </a:p>
@@ -1736,7 +1742,7 @@
           <a:ln/>
           <a:extLst>
             <a:ext uri="{91240B29-F687-4f45-9708-019B960494DF}">
-              <a14:hiddenLine xmlns:a14="http://schemas.microsoft.com/office/drawing/2010/main" xmlns="" w="9525">
+              <a14:hiddenLine xmlns="" xmlns:a14="http://schemas.microsoft.com/office/drawing/2010/main" w="9525">
                 <a:solidFill>
                   <a:srgbClr val="000000"/>
                 </a:solidFill>
@@ -1854,7 +1860,7 @@
           <a:p>
             <a:fld id="{2373D046-40F4-47F3-9B97-2E7371F9C148}" type="datetimeFigureOut">
               <a:rPr lang="en-US" smtClean="0"/>
-              <a:t>8/27/2016</a:t>
+              <a:t>8/27/16</a:t>
             </a:fld>
             <a:endParaRPr lang="en-US"/>
           </a:p>
@@ -2011,7 +2017,7 @@
           <a:ln/>
           <a:extLst>
             <a:ext uri="{91240B29-F687-4f45-9708-019B960494DF}">
-              <a14:hiddenLine xmlns:a14="http://schemas.microsoft.com/office/drawing/2010/main" xmlns="" w="9525">
+              <a14:hiddenLine xmlns="" xmlns:a14="http://schemas.microsoft.com/office/drawing/2010/main" w="9525">
                 <a:solidFill>
                   <a:srgbClr val="000000"/>
                 </a:solidFill>
@@ -2139,7 +2145,7 @@
           <a:p>
             <a:fld id="{2373D046-40F4-47F3-9B97-2E7371F9C148}" type="datetimeFigureOut">
               <a:rPr lang="en-US" smtClean="0"/>
-              <a:t>8/27/2016</a:t>
+              <a:t>8/27/16</a:t>
             </a:fld>
             <a:endParaRPr lang="en-US"/>
           </a:p>
@@ -2294,7 +2300,7 @@
           <a:ln/>
           <a:extLst>
             <a:ext uri="{91240B29-F687-4f45-9708-019B960494DF}">
-              <a14:hiddenLine xmlns:a14="http://schemas.microsoft.com/office/drawing/2010/main" xmlns="" w="9525">
+              <a14:hiddenLine xmlns="" xmlns:a14="http://schemas.microsoft.com/office/drawing/2010/main" w="9525">
                 <a:solidFill>
                   <a:srgbClr val="000000"/>
                 </a:solidFill>
@@ -2422,7 +2428,7 @@
           <a:p>
             <a:fld id="{2373D046-40F4-47F3-9B97-2E7371F9C148}" type="datetimeFigureOut">
               <a:rPr lang="en-US" smtClean="0"/>
-              <a:t>8/27/2016</a:t>
+              <a:t>8/27/16</a:t>
             </a:fld>
             <a:endParaRPr lang="en-US"/>
           </a:p>
@@ -2765,7 +2771,7 @@
           <a:p>
             <a:fld id="{2373D046-40F4-47F3-9B97-2E7371F9C148}" type="datetimeFigureOut">
               <a:rPr lang="en-US" smtClean="0"/>
-              <a:t>8/27/2016</a:t>
+              <a:t>8/27/16</a:t>
             </a:fld>
             <a:endParaRPr lang="en-US"/>
           </a:p>
@@ -2920,7 +2926,7 @@
           <a:ln/>
           <a:extLst>
             <a:ext uri="{91240B29-F687-4f45-9708-019B960494DF}">
-              <a14:hiddenLine xmlns:a14="http://schemas.microsoft.com/office/drawing/2010/main" xmlns="" w="9525">
+              <a14:hiddenLine xmlns="" xmlns:a14="http://schemas.microsoft.com/office/drawing/2010/main" w="9525">
                 <a:solidFill>
                   <a:srgbClr val="000000"/>
                 </a:solidFill>
@@ -3104,7 +3110,7 @@
           <a:p>
             <a:fld id="{2373D046-40F4-47F3-9B97-2E7371F9C148}" type="datetimeFigureOut">
               <a:rPr lang="en-US" smtClean="0"/>
-              <a:t>8/27/2016</a:t>
+              <a:t>8/27/16</a:t>
             </a:fld>
             <a:endParaRPr lang="en-US"/>
           </a:p>
@@ -3259,7 +3265,7 @@
           <a:ln/>
           <a:extLst>
             <a:ext uri="{91240B29-F687-4f45-9708-019B960494DF}">
-              <a14:hiddenLine xmlns:a14="http://schemas.microsoft.com/office/drawing/2010/main" xmlns="" w="9525">
+              <a14:hiddenLine xmlns="" xmlns:a14="http://schemas.microsoft.com/office/drawing/2010/main" w="9525">
                 <a:solidFill>
                   <a:srgbClr val="000000"/>
                 </a:solidFill>
@@ -3581,7 +3587,7 @@
           <a:p>
             <a:fld id="{2373D046-40F4-47F3-9B97-2E7371F9C148}" type="datetimeFigureOut">
               <a:rPr lang="en-US" smtClean="0"/>
-              <a:t>8/27/2016</a:t>
+              <a:t>8/27/16</a:t>
             </a:fld>
             <a:endParaRPr lang="en-US"/>
           </a:p>
@@ -3736,7 +3742,7 @@
           <a:ln/>
           <a:extLst>
             <a:ext uri="{91240B29-F687-4f45-9708-019B960494DF}">
-              <a14:hiddenLine xmlns:a14="http://schemas.microsoft.com/office/drawing/2010/main" xmlns="" w="9525">
+              <a14:hiddenLine xmlns="" xmlns:a14="http://schemas.microsoft.com/office/drawing/2010/main" w="9525">
                 <a:solidFill>
                   <a:srgbClr val="000000"/>
                 </a:solidFill>
@@ -3802,7 +3808,7 @@
           <a:p>
             <a:fld id="{2373D046-40F4-47F3-9B97-2E7371F9C148}" type="datetimeFigureOut">
               <a:rPr lang="en-US" smtClean="0"/>
-              <a:t>8/27/2016</a:t>
+              <a:t>8/27/16</a:t>
             </a:fld>
             <a:endParaRPr lang="en-US"/>
           </a:p>
@@ -3897,7 +3903,7 @@
           <a:p>
             <a:fld id="{2373D046-40F4-47F3-9B97-2E7371F9C148}" type="datetimeFigureOut">
               <a:rPr lang="en-US" smtClean="0"/>
-              <a:t>8/27/2016</a:t>
+              <a:t>8/27/16</a:t>
             </a:fld>
             <a:endParaRPr lang="en-US"/>
           </a:p>
@@ -4165,7 +4171,7 @@
           <a:ln/>
           <a:extLst>
             <a:ext uri="{91240B29-F687-4f45-9708-019B960494DF}">
-              <a14:hiddenLine xmlns:a14="http://schemas.microsoft.com/office/drawing/2010/main" xmlns="" w="9525">
+              <a14:hiddenLine xmlns="" xmlns:a14="http://schemas.microsoft.com/office/drawing/2010/main" w="9525">
                 <a:solidFill>
                   <a:srgbClr val="000000"/>
                 </a:solidFill>
@@ -4364,7 +4370,7 @@
           <a:p>
             <a:fld id="{2373D046-40F4-47F3-9B97-2E7371F9C148}" type="datetimeFigureOut">
               <a:rPr lang="en-US" smtClean="0"/>
-              <a:t>8/27/2016</a:t>
+              <a:t>8/27/16</a:t>
             </a:fld>
             <a:endParaRPr lang="en-US"/>
           </a:p>
@@ -4677,7 +4683,7 @@
           <a:p>
             <a:fld id="{2373D046-40F4-47F3-9B97-2E7371F9C148}" type="datetimeFigureOut">
               <a:rPr lang="en-US" smtClean="0"/>
-              <a:t>8/27/2016</a:t>
+              <a:t>8/27/16</a:t>
             </a:fld>
             <a:endParaRPr lang="en-US"/>
           </a:p>
@@ -4947,7 +4953,7 @@
           <a:p>
             <a:fld id="{2373D046-40F4-47F3-9B97-2E7371F9C148}" type="datetimeFigureOut">
               <a:rPr lang="en-US" smtClean="0"/>
-              <a:t>8/27/2016</a:t>
+              <a:t>8/27/16</a:t>
             </a:fld>
             <a:endParaRPr lang="en-US"/>
           </a:p>
@@ -5866,6 +5872,94 @@
     <p:extLst>
       <p:ext uri="{BB962C8B-B14F-4D97-AF65-F5344CB8AC3E}">
         <p14:creationId xmlns:p14="http://schemas.microsoft.com/office/powerpoint/2010/main" val="3130580817"/>
+      </p:ext>
+    </p:extLst>
+  </p:cSld>
+  <p:clrMapOvr>
+    <a:masterClrMapping/>
+  </p:clrMapOvr>
+</p:sld>
+</file>
+
+<file path=ppt/slides/slide14.xml><?xml version="1.0" encoding="utf-8"?>
+<p:sld xmlns:a="http://schemas.openxmlformats.org/drawingml/2006/main" xmlns:r="http://schemas.openxmlformats.org/officeDocument/2006/relationships" xmlns:p="http://schemas.openxmlformats.org/presentationml/2006/main">
+  <p:cSld>
+    <p:spTree>
+      <p:nvGrpSpPr>
+        <p:cNvPr id="1" name=""/>
+        <p:cNvGrpSpPr/>
+        <p:nvPr/>
+      </p:nvGrpSpPr>
+      <p:grpSpPr>
+        <a:xfrm>
+          <a:off x="0" y="0"/>
+          <a:ext cx="0" cy="0"/>
+          <a:chOff x="0" y="0"/>
+          <a:chExt cx="0" cy="0"/>
+        </a:xfrm>
+      </p:grpSpPr>
+      <p:sp>
+        <p:nvSpPr>
+          <p:cNvPr id="2" name="Title 1"/>
+          <p:cNvSpPr>
+            <a:spLocks noGrp="1"/>
+          </p:cNvSpPr>
+          <p:nvPr>
+            <p:ph type="title"/>
+          </p:nvPr>
+        </p:nvSpPr>
+        <p:spPr/>
+        <p:txBody>
+          <a:bodyPr/>
+          <a:lstStyle/>
+          <a:p>
+            <a:r>
+              <a:rPr lang="en-US" dirty="0" smtClean="0"/>
+              <a:t>API Wishes</a:t>
+            </a:r>
+            <a:endParaRPr lang="en-US" dirty="0"/>
+          </a:p>
+        </p:txBody>
+      </p:sp>
+      <p:sp>
+        <p:nvSpPr>
+          <p:cNvPr id="3" name="Content Placeholder 2"/>
+          <p:cNvSpPr>
+            <a:spLocks noGrp="1"/>
+          </p:cNvSpPr>
+          <p:nvPr>
+            <p:ph idx="1"/>
+          </p:nvPr>
+        </p:nvSpPr>
+        <p:spPr/>
+        <p:txBody>
+          <a:bodyPr/>
+          <a:lstStyle/>
+          <a:p>
+            <a:r>
+              <a:rPr lang="en-US" dirty="0" smtClean="0"/>
+              <a:t>Users are able to input tasks they want to help others with. </a:t>
+            </a:r>
+            <a:r>
+              <a:rPr lang="en-US" dirty="0" err="1" smtClean="0"/>
+              <a:t>API.ai</a:t>
+            </a:r>
+            <a:r>
+              <a:rPr lang="en-US" dirty="0" smtClean="0"/>
+              <a:t> will be able to spot key words and search for specific tasks accordingly based </a:t>
+            </a:r>
+            <a:r>
+              <a:rPr lang="en-US" smtClean="0"/>
+              <a:t>on categorization.</a:t>
+            </a:r>
+            <a:endParaRPr lang="en-US" dirty="0"/>
+          </a:p>
+        </p:txBody>
+      </p:sp>
+    </p:spTree>
+    <p:extLst>
+      <p:ext uri="{BB962C8B-B14F-4D97-AF65-F5344CB8AC3E}">
+        <p14:creationId xmlns:p14="http://schemas.microsoft.com/office/powerpoint/2010/main" val="707556250"/>
       </p:ext>
     </p:extLst>
   </p:cSld>

</xml_diff>